<commit_message>
Verslag nagekeken op spelfouten nog een x
</commit_message>
<xml_diff>
--- a/Fruitvliegen_Presentatie_FINAL VERSION OF DOOM.pptx
+++ b/Fruitvliegen_Presentatie_FINAL VERSION OF DOOM.pptx
@@ -124,7 +124,7 @@
   </p:defaultTextStyle>
   <p:extLst>
     <p:ext uri="{EFAFB233-063F-42B5-8137-9DF3F51BA10A}">
-      <p15:sldGuideLst xmlns:p15="http://schemas.microsoft.com/office/powerpoint/2012/main">
+      <p15:sldGuideLst xmlns:p15="http://schemas.microsoft.com/office/powerpoint/2012/main" xmlns="">
         <p15:guide id="1" orient="horz" pos="2160">
           <p15:clr>
             <a:srgbClr val="A4A3A4"/>
@@ -4934,7 +4934,7 @@
         </p:nvSpPr>
         <p:spPr>
           <a:xfrm>
-            <a:off x="838200" y="4495800"/>
+            <a:off x="762000" y="4495800"/>
             <a:ext cx="6858000" cy="914400"/>
           </a:xfrm>
         </p:spPr>
@@ -4950,6 +4950,47 @@
           </a:p>
         </p:txBody>
       </p:sp>
+      <p:pic>
+        <p:nvPicPr>
+          <p:cNvPr id="1026" name="Picture 2" descr="http://static.tumblr.com/5eqg2zi/wpem20hh4/63104_fruit_fly_sm.gif"/>
+          <p:cNvPicPr>
+            <a:picLocks noChangeAspect="1" noChangeArrowheads="1"/>
+          </p:cNvPicPr>
+          <p:nvPr/>
+        </p:nvPicPr>
+        <p:blipFill>
+          <a:blip r:embed="rId2">
+            <a:extLst>
+              <a:ext uri="{28A0092B-C50C-407E-A947-70E740481C1C}">
+                <a14:useLocalDpi xmlns:a14="http://schemas.microsoft.com/office/drawing/2010/main" val="0"/>
+              </a:ext>
+            </a:extLst>
+          </a:blip>
+          <a:srcRect/>
+          <a:stretch>
+            <a:fillRect/>
+          </a:stretch>
+        </p:blipFill>
+        <p:spPr bwMode="auto">
+          <a:xfrm>
+            <a:off x="838200" y="1371600"/>
+            <a:ext cx="1905000" cy="2076450"/>
+          </a:xfrm>
+          <a:prstGeom prst="rect">
+            <a:avLst/>
+          </a:prstGeom>
+          <a:noFill/>
+          <a:extLst>
+            <a:ext uri="{909E8E84-426E-40DD-AFC4-6F175D3DCCD1}">
+              <a14:hiddenFill xmlns:a14="http://schemas.microsoft.com/office/drawing/2010/main">
+                <a:solidFill>
+                  <a:srgbClr val="FFFFFF"/>
+                </a:solidFill>
+              </a14:hiddenFill>
+            </a:ext>
+          </a:extLst>
+        </p:spPr>
+      </p:pic>
     </p:spTree>
     <p:extLst>
       <p:ext uri="{BB962C8B-B14F-4D97-AF65-F5344CB8AC3E}">
@@ -8089,7 +8130,15 @@
             </a:pPr>
             <a:r>
               <a:rPr lang="nl-NL" b="1" dirty="0" smtClean="0"/>
-              <a:t>Wat maakt een genoom moeilijk “op te lossen”?</a:t>
+              <a:t>Wat maakt een genoom </a:t>
+            </a:r>
+            <a:r>
+              <a:rPr lang="nl-NL" b="1" u="sng" dirty="0" smtClean="0"/>
+              <a:t>moeilijk</a:t>
+            </a:r>
+            <a:r>
+              <a:rPr lang="nl-NL" b="1" dirty="0" smtClean="0"/>
+              <a:t> “op te lossen”?</a:t>
             </a:r>
           </a:p>
           <a:p>
@@ -8102,6 +8151,15 @@
             </a:r>
           </a:p>
           <a:p>
+            <a:endParaRPr lang="nl-NL" dirty="0" smtClean="0"/>
+          </a:p>
+          <a:p>
+            <a:endParaRPr lang="nl-NL" dirty="0"/>
+          </a:p>
+          <a:p>
+            <a:endParaRPr lang="nl-NL" dirty="0" smtClean="0"/>
+          </a:p>
+          <a:p>
             <a:endParaRPr lang="nl-NL" dirty="0"/>
           </a:p>
           <a:p>
@@ -8116,6 +8174,36 @@
           </a:p>
         </p:txBody>
       </p:sp>
+      <p:pic>
+        <p:nvPicPr>
+          <p:cNvPr id="4" name="Content Placeholder 3"/>
+          <p:cNvPicPr>
+            <a:picLocks noChangeAspect="1"/>
+          </p:cNvPicPr>
+          <p:nvPr/>
+        </p:nvPicPr>
+        <p:blipFill>
+          <a:blip r:embed="rId3">
+            <a:extLst>
+              <a:ext uri="{28A0092B-C50C-407E-A947-70E740481C1C}">
+                <a14:useLocalDpi xmlns:a14="http://schemas.microsoft.com/office/drawing/2010/main" val="0"/>
+              </a:ext>
+            </a:extLst>
+          </a:blip>
+          <a:stretch>
+            <a:fillRect/>
+          </a:stretch>
+        </p:blipFill>
+        <p:spPr>
+          <a:xfrm>
+            <a:off x="67733" y="3069591"/>
+            <a:ext cx="8305800" cy="646006"/>
+          </a:xfrm>
+          <a:prstGeom prst="rect">
+            <a:avLst/>
+          </a:prstGeom>
+        </p:spPr>
+      </p:pic>
     </p:spTree>
     <p:extLst>
       <p:ext uri="{BB962C8B-B14F-4D97-AF65-F5344CB8AC3E}">
@@ -10956,11 +11044,7 @@
           <a:p>
             <a:r>
               <a:rPr lang="nl-NL" dirty="0" smtClean="0"/>
-              <a:t>Bovengrens inversies: </a:t>
-            </a:r>
-            <a:r>
-              <a:rPr lang="nl-NL" dirty="0" smtClean="0"/>
-              <a:t>24 (n-1)</a:t>
+              <a:t>Bovengrens inversies: 24 (n-1)</a:t>
             </a:r>
             <a:endParaRPr lang="nl-NL" baseline="30000" dirty="0"/>
           </a:p>

</xml_diff>